<commit_message>
post-meeting updates to F2F presenations
</commit_message>
<xml_diff>
--- a/PRESENTATIONS/2021-10-online-f2f/2021-10-05-WoT-F2F-Discovery-McCool.pptx
+++ b/PRESENTATIONS/2021-10-online-f2f/2021-10-05-WoT-F2F-Discovery-McCool.pptx
@@ -214,7 +214,7 @@
           <a:p>
             <a:fld id="{8389B5DD-0274-BF45-B4C5-62E173E8F634}" type="datetimeFigureOut">
               <a:rPr lang="en-US" smtClean="0"/>
-              <a:t>10/4/21</a:t>
+              <a:t>10/5/21</a:t>
             </a:fld>
             <a:endParaRPr lang="en-US"/>
           </a:p>
@@ -830,7 +830,7 @@
           <a:p>
             <a:fld id="{2F93E591-CC8D-C74E-8EED-098A7FB5E64D}" type="datetime1">
               <a:rPr lang="en-CA" smtClean="0"/>
-              <a:t>2021-10-04</a:t>
+              <a:t>2021-10-05</a:t>
             </a:fld>
             <a:endParaRPr lang="en-US"/>
           </a:p>
@@ -1098,7 +1098,7 @@
           <a:p>
             <a:fld id="{2E1BC118-574D-594E-ABEA-A7C82666C9AB}" type="datetime1">
               <a:rPr lang="en-CA" smtClean="0"/>
-              <a:t>2021-10-04</a:t>
+              <a:t>2021-10-05</a:t>
             </a:fld>
             <a:endParaRPr lang="en-US"/>
           </a:p>
@@ -1464,7 +1464,7 @@
           <a:p>
             <a:fld id="{B929AB1E-7FD9-0A40-B7C0-508CCACB3E9A}" type="datetime1">
               <a:rPr lang="en-CA" smtClean="0"/>
-              <a:t>2021-10-04</a:t>
+              <a:t>2021-10-05</a:t>
             </a:fld>
             <a:endParaRPr lang="en-US"/>
           </a:p>
@@ -1696,7 +1696,7 @@
           <a:p>
             <a:fld id="{5AE8723F-57EA-4C47-97B9-92AFDEEF85DC}" type="datetime1">
               <a:rPr lang="en-CA" smtClean="0"/>
-              <a:t>2021-10-04</a:t>
+              <a:t>2021-10-05</a:t>
             </a:fld>
             <a:endParaRPr lang="en-US"/>
           </a:p>
@@ -2026,7 +2026,7 @@
           <a:p>
             <a:fld id="{B2B00E5D-EC04-AA49-8D52-0FCB6E08F63D}" type="datetime1">
               <a:rPr lang="en-CA" smtClean="0"/>
-              <a:t>2021-10-04</a:t>
+              <a:t>2021-10-05</a:t>
             </a:fld>
             <a:endParaRPr lang="en-US"/>
           </a:p>
@@ -2499,7 +2499,7 @@
           <a:p>
             <a:fld id="{FF90905C-10FF-8047-AA7E-6DC7E8B6AF51}" type="datetime1">
               <a:rPr lang="en-CA" smtClean="0"/>
-              <a:t>2021-10-04</a:t>
+              <a:t>2021-10-05</a:t>
             </a:fld>
             <a:endParaRPr lang="en-US"/>
           </a:p>
@@ -2705,7 +2705,7 @@
           <a:p>
             <a:fld id="{D1CE86E2-4400-D342-BEEC-F9C1ADF6F9F7}" type="datetime1">
               <a:rPr lang="en-CA" smtClean="0"/>
-              <a:t>2021-10-04</a:t>
+              <a:t>2021-10-05</a:t>
             </a:fld>
             <a:endParaRPr lang="en-US"/>
           </a:p>
@@ -2875,7 +2875,7 @@
           <a:p>
             <a:fld id="{74358A08-7221-7F45-8378-69D5559861DD}" type="datetime1">
               <a:rPr lang="en-CA" smtClean="0"/>
-              <a:t>2021-10-04</a:t>
+              <a:t>2021-10-05</a:t>
             </a:fld>
             <a:endParaRPr lang="en-US"/>
           </a:p>
@@ -3247,7 +3247,7 @@
           <a:p>
             <a:fld id="{08C20FDB-303D-8A4E-83B7-226DD88B97BD}" type="datetime1">
               <a:rPr lang="en-CA" smtClean="0"/>
-              <a:t>2021-10-04</a:t>
+              <a:t>2021-10-05</a:t>
             </a:fld>
             <a:endParaRPr lang="en-US"/>
           </a:p>
@@ -3599,7 +3599,7 @@
           <a:p>
             <a:fld id="{0A9EBA37-9D18-D34A-A88D-1B00AA06E95C}" type="datetime1">
               <a:rPr lang="en-CA" smtClean="0"/>
-              <a:t>2021-10-04</a:t>
+              <a:t>2021-10-05</a:t>
             </a:fld>
             <a:endParaRPr lang="en-US"/>
           </a:p>
@@ -3939,7 +3939,7 @@
             <a:fld id="{B73A2E78-F38A-E046-ACDB-668F070D1EF6}" type="datetime1">
               <a:rPr lang="en-CA" smtClean="0"/>
               <a:pPr/>
-              <a:t>2021-10-04</a:t>
+              <a:t>2021-10-05</a:t>
             </a:fld>
             <a:endParaRPr lang="en-US" dirty="0"/>
           </a:p>
@@ -4559,7 +4559,7 @@
           <a:p>
             <a:fld id="{BF92DA42-2970-1B4D-9C1F-77F249CD7467}" type="datetime1">
               <a:rPr lang="en-CA" smtClean="0"/>
-              <a:t>2021-10-04</a:t>
+              <a:t>2021-10-05</a:t>
             </a:fld>
             <a:endParaRPr lang="en-US" dirty="0"/>
           </a:p>
@@ -4794,7 +4794,7 @@
           <a:p>
             <a:fld id="{BF92DA42-2970-1B4D-9C1F-77F249CD7467}" type="datetime1">
               <a:rPr lang="en-CA" smtClean="0"/>
-              <a:t>2021-10-04</a:t>
+              <a:t>2021-10-05</a:t>
             </a:fld>
             <a:endParaRPr lang="en-US" dirty="0"/>
           </a:p>
@@ -5033,7 +5033,7 @@
           <a:p>
             <a:fld id="{BF92DA42-2970-1B4D-9C1F-77F249CD7467}" type="datetime1">
               <a:rPr lang="en-CA" smtClean="0"/>
-              <a:t>2021-10-04</a:t>
+              <a:t>2021-10-05</a:t>
             </a:fld>
             <a:endParaRPr lang="en-US" dirty="0"/>
           </a:p>
@@ -5267,7 +5267,7 @@
           <a:p>
             <a:fld id="{BF92DA42-2970-1B4D-9C1F-77F249CD7467}" type="datetime1">
               <a:rPr lang="en-CA" smtClean="0"/>
-              <a:t>2021-10-04</a:t>
+              <a:t>2021-10-05</a:t>
             </a:fld>
             <a:endParaRPr lang="en-US" dirty="0"/>
           </a:p>
@@ -5540,7 +5540,7 @@
           <a:p>
             <a:fld id="{BF92DA42-2970-1B4D-9C1F-77F249CD7467}" type="datetime1">
               <a:rPr lang="en-CA" smtClean="0"/>
-              <a:t>2021-10-04</a:t>
+              <a:t>2021-10-05</a:t>
             </a:fld>
             <a:endParaRPr lang="en-US" dirty="0"/>
           </a:p>
@@ -5777,23 +5777,13 @@
             <a:pPr lvl="1"/>
             <a:r>
               <a:rPr lang="en-US" dirty="0"/>
-              <a:t>But, if we have to make XPath the primary query type instead, we will need another XPath implementation</a:t>
-            </a:r>
-          </a:p>
-          <a:p>
-            <a:pPr lvl="1"/>
-            <a:r>
-              <a:rPr lang="en-US" dirty="0"/>
-              <a:t>One of the implementations is only SPARQL, does not implement "primary" query type (currently </a:t>
-            </a:r>
-            <a:r>
-              <a:rPr lang="en-US" dirty="0" err="1"/>
-              <a:t>JSONPath</a:t>
-            </a:r>
-            <a:r>
-              <a:rPr lang="en-US" dirty="0"/>
-              <a:t>)</a:t>
-            </a:r>
+              <a:t>Need two implementations now of EVERY feature</a:t>
+            </a:r>
+            <a:r>
+              <a:rPr lang="en-US"/>
+              <a:t>, even optional ones</a:t>
+            </a:r>
+            <a:endParaRPr lang="en-US" dirty="0"/>
           </a:p>
         </p:txBody>
       </p:sp>
@@ -5877,7 +5867,7 @@
           <a:p>
             <a:fld id="{B929AB1E-7FD9-0A40-B7C0-508CCACB3E9A}" type="datetime1">
               <a:rPr lang="en-CA" smtClean="0"/>
-              <a:t>2021-10-04</a:t>
+              <a:t>2021-10-05</a:t>
             </a:fld>
             <a:endParaRPr lang="en-US"/>
           </a:p>

</xml_diff>